<commit_message>
added new data, created classification and various models
</commit_message>
<xml_diff>
--- a/report/Infineon_PSOC6_Lecture_Project_Status_Template.pptx
+++ b/report/Infineon_PSOC6_Lecture_Project_Status_Template.pptx
@@ -24323,21 +24323,21 @@
 </file>
 
 <file path=customXml/item1.xml><?xml version="1.0" encoding="utf-8"?>
+<p:properties xmlns:p="http://schemas.microsoft.com/office/2006/metadata/properties" xmlns:xsi="http://www.w3.org/2001/XMLSchema-instance" xmlns:pc="http://schemas.microsoft.com/office/infopath/2007/PartnerControls">
+  <documentManagement>
+    <_ip_UnifiedCompliancePolicyUIAction xmlns="http://schemas.microsoft.com/sharepoint/v3" xsi:nil="true"/>
+    <_ip_UnifiedCompliancePolicyProperties xmlns="http://schemas.microsoft.com/sharepoint/v3" xsi:nil="true"/>
+  </documentManagement>
+</p:properties>
+</file>
+
+<file path=customXml/item2.xml><?xml version="1.0" encoding="utf-8"?>
 <?mso-contentType ?>
 <FormTemplates xmlns="http://schemas.microsoft.com/sharepoint/v3/contenttype/forms">
   <Display>DocumentLibraryForm</Display>
   <Edit>DocumentLibraryForm</Edit>
   <New>DocumentLibraryForm</New>
 </FormTemplates>
-</file>
-
-<file path=customXml/item2.xml><?xml version="1.0" encoding="utf-8"?>
-<p:properties xmlns:p="http://schemas.microsoft.com/office/2006/metadata/properties" xmlns:xsi="http://www.w3.org/2001/XMLSchema-instance" xmlns:pc="http://schemas.microsoft.com/office/infopath/2007/PartnerControls">
-  <documentManagement>
-    <_ip_UnifiedCompliancePolicyUIAction xmlns="http://schemas.microsoft.com/sharepoint/v3" xsi:nil="true"/>
-    <_ip_UnifiedCompliancePolicyProperties xmlns="http://schemas.microsoft.com/sharepoint/v3" xsi:nil="true"/>
-  </documentManagement>
-</p:properties>
 </file>
 
 <file path=customXml/item3.xml><?xml version="1.0" encoding="utf-8"?>
@@ -24528,14 +24528,6 @@
 </file>
 
 <file path=customXml/itemProps1.xml><?xml version="1.0" encoding="utf-8"?>
-<ds:datastoreItem xmlns:ds="http://schemas.openxmlformats.org/officeDocument/2006/customXml" ds:itemID="{63C6748B-B74E-4BE1-834C-AEBB9BCA18FB}">
-  <ds:schemaRefs>
-    <ds:schemaRef ds:uri="http://schemas.microsoft.com/sharepoint/v3/contenttype/forms"/>
-  </ds:schemaRefs>
-</ds:datastoreItem>
-</file>
-
-<file path=customXml/itemProps2.xml><?xml version="1.0" encoding="utf-8"?>
 <ds:datastoreItem xmlns:ds="http://schemas.openxmlformats.org/officeDocument/2006/customXml" ds:itemID="{D299A1D5-F553-4264-9022-E0136C61CE27}">
   <ds:schemaRefs>
     <ds:schemaRef ds:uri="http://schemas.microsoft.com/office/infopath/2007/PartnerControls"/>
@@ -24548,6 +24540,14 @@
     <ds:schemaRef ds:uri="http://www.w3.org/XML/1998/namespace"/>
     <ds:schemaRef ds:uri="http://purl.org/dc/dcmitype/"/>
     <ds:schemaRef ds:uri="http://purl.org/dc/terms/"/>
+  </ds:schemaRefs>
+</ds:datastoreItem>
+</file>
+
+<file path=customXml/itemProps2.xml><?xml version="1.0" encoding="utf-8"?>
+<ds:datastoreItem xmlns:ds="http://schemas.openxmlformats.org/officeDocument/2006/customXml" ds:itemID="{63C6748B-B74E-4BE1-834C-AEBB9BCA18FB}">
+  <ds:schemaRefs>
+    <ds:schemaRef ds:uri="http://schemas.microsoft.com/sharepoint/v3/contenttype/forms"/>
   </ds:schemaRefs>
 </ds:datastoreItem>
 </file>

</xml_diff>